<commit_message>
continuer power point python
</commit_message>
<xml_diff>
--- a/Python/Défi_python.pptx
+++ b/Python/Défi_python.pptx
@@ -12,14 +12,20 @@
     <p:sldId id="269" r:id="rId6"/>
     <p:sldId id="266" r:id="rId7"/>
     <p:sldId id="261" r:id="rId8"/>
-    <p:sldId id="262" r:id="rId9"/>
-    <p:sldId id="267" r:id="rId10"/>
-    <p:sldId id="268" r:id="rId11"/>
-    <p:sldId id="259" r:id="rId12"/>
-    <p:sldId id="260" r:id="rId13"/>
-    <p:sldId id="263" r:id="rId14"/>
-    <p:sldId id="270" r:id="rId15"/>
-    <p:sldId id="264" r:id="rId16"/>
+    <p:sldId id="271" r:id="rId9"/>
+    <p:sldId id="262" r:id="rId10"/>
+    <p:sldId id="272" r:id="rId11"/>
+    <p:sldId id="274" r:id="rId12"/>
+    <p:sldId id="275" r:id="rId13"/>
+    <p:sldId id="276" r:id="rId14"/>
+    <p:sldId id="267" r:id="rId15"/>
+    <p:sldId id="268" r:id="rId16"/>
+    <p:sldId id="273" r:id="rId17"/>
+    <p:sldId id="259" r:id="rId18"/>
+    <p:sldId id="260" r:id="rId19"/>
+    <p:sldId id="263" r:id="rId20"/>
+    <p:sldId id="270" r:id="rId21"/>
+    <p:sldId id="264" r:id="rId22"/>
   </p:sldIdLst>
   <p:sldSz cx="12192000" cy="6858000"/>
   <p:notesSz cx="6858000" cy="9144000"/>
@@ -352,7 +358,7 @@
           <a:p>
             <a:fld id="{4C3FC2A8-83AB-4BB4-BB9D-D01C57868A4C}" type="datetimeFigureOut">
               <a:rPr lang="fr-CA" smtClean="0"/>
-              <a:t>2020-04-23</a:t>
+              <a:t>2020-05-07</a:t>
             </a:fld>
             <a:endParaRPr lang="fr-CA"/>
           </a:p>
@@ -560,7 +566,7 @@
           <a:p>
             <a:fld id="{4C3FC2A8-83AB-4BB4-BB9D-D01C57868A4C}" type="datetimeFigureOut">
               <a:rPr lang="fr-CA" smtClean="0"/>
-              <a:t>2020-04-23</a:t>
+              <a:t>2020-05-07</a:t>
             </a:fld>
             <a:endParaRPr lang="fr-CA"/>
           </a:p>
@@ -816,7 +822,7 @@
           <a:p>
             <a:fld id="{4C3FC2A8-83AB-4BB4-BB9D-D01C57868A4C}" type="datetimeFigureOut">
               <a:rPr lang="fr-CA" smtClean="0"/>
-              <a:t>2020-04-23</a:t>
+              <a:t>2020-05-07</a:t>
             </a:fld>
             <a:endParaRPr lang="fr-CA"/>
           </a:p>
@@ -990,7 +996,7 @@
           <a:p>
             <a:fld id="{4C3FC2A8-83AB-4BB4-BB9D-D01C57868A4C}" type="datetimeFigureOut">
               <a:rPr lang="fr-CA" smtClean="0"/>
-              <a:t>2020-04-23</a:t>
+              <a:t>2020-05-07</a:t>
             </a:fld>
             <a:endParaRPr lang="fr-CA"/>
           </a:p>
@@ -1333,7 +1339,7 @@
           <a:p>
             <a:fld id="{4C3FC2A8-83AB-4BB4-BB9D-D01C57868A4C}" type="datetimeFigureOut">
               <a:rPr lang="fr-CA" smtClean="0"/>
-              <a:t>2020-04-23</a:t>
+              <a:t>2020-05-07</a:t>
             </a:fld>
             <a:endParaRPr lang="fr-CA"/>
           </a:p>
@@ -1608,7 +1614,7 @@
           <a:p>
             <a:fld id="{4C3FC2A8-83AB-4BB4-BB9D-D01C57868A4C}" type="datetimeFigureOut">
               <a:rPr lang="fr-CA" smtClean="0"/>
-              <a:t>2020-04-23</a:t>
+              <a:t>2020-05-07</a:t>
             </a:fld>
             <a:endParaRPr lang="fr-CA"/>
           </a:p>
@@ -1987,7 +1993,7 @@
           <a:p>
             <a:fld id="{4C3FC2A8-83AB-4BB4-BB9D-D01C57868A4C}" type="datetimeFigureOut">
               <a:rPr lang="fr-CA" smtClean="0"/>
-              <a:t>2020-04-23</a:t>
+              <a:t>2020-05-07</a:t>
             </a:fld>
             <a:endParaRPr lang="fr-CA"/>
           </a:p>
@@ -2105,7 +2111,7 @@
           <a:p>
             <a:fld id="{4C3FC2A8-83AB-4BB4-BB9D-D01C57868A4C}" type="datetimeFigureOut">
               <a:rPr lang="fr-CA" smtClean="0"/>
-              <a:t>2020-04-23</a:t>
+              <a:t>2020-05-07</a:t>
             </a:fld>
             <a:endParaRPr lang="fr-CA"/>
           </a:p>
@@ -2276,7 +2282,7 @@
           <a:p>
             <a:fld id="{4C3FC2A8-83AB-4BB4-BB9D-D01C57868A4C}" type="datetimeFigureOut">
               <a:rPr lang="fr-CA" smtClean="0"/>
-              <a:t>2020-04-23</a:t>
+              <a:t>2020-05-07</a:t>
             </a:fld>
             <a:endParaRPr lang="fr-CA"/>
           </a:p>
@@ -2630,7 +2636,7 @@
           <a:p>
             <a:fld id="{4C3FC2A8-83AB-4BB4-BB9D-D01C57868A4C}" type="datetimeFigureOut">
               <a:rPr lang="fr-CA" smtClean="0"/>
-              <a:t>2020-04-23</a:t>
+              <a:t>2020-05-07</a:t>
             </a:fld>
             <a:endParaRPr lang="fr-CA"/>
           </a:p>
@@ -3012,7 +3018,7 @@
           <a:p>
             <a:fld id="{4C3FC2A8-83AB-4BB4-BB9D-D01C57868A4C}" type="datetimeFigureOut">
               <a:rPr lang="fr-CA" smtClean="0"/>
-              <a:t>2020-04-23</a:t>
+              <a:t>2020-05-07</a:t>
             </a:fld>
             <a:endParaRPr lang="fr-CA"/>
           </a:p>
@@ -3299,7 +3305,7 @@
           <a:p>
             <a:fld id="{4C3FC2A8-83AB-4BB4-BB9D-D01C57868A4C}" type="datetimeFigureOut">
               <a:rPr lang="fr-CA" smtClean="0"/>
-              <a:t>2020-04-23</a:t>
+              <a:t>2020-05-07</a:t>
             </a:fld>
             <a:endParaRPr lang="fr-CA"/>
           </a:p>
@@ -3957,7 +3963,7 @@
           <p:cNvPr id="2" name="Titre 1">
             <a:extLst>
               <a:ext uri="{FF2B5EF4-FFF2-40B4-BE49-F238E27FC236}">
-                <a16:creationId xmlns:a16="http://schemas.microsoft.com/office/drawing/2014/main" id="{97DC4A41-3C2A-42A6-B219-00C31CD23AAE}"/>
+                <a16:creationId xmlns:a16="http://schemas.microsoft.com/office/drawing/2014/main" id="{E9E61BD9-EC82-49A9-B333-AABDB0DA0CAE}"/>
               </a:ext>
             </a:extLst>
           </p:cNvPr>
@@ -3974,9 +3980,10 @@
           <a:lstStyle/>
           <a:p>
             <a:r>
-              <a:rPr lang="fr-CA" dirty="0"/>
-              <a:t>Comparaison</a:t>
-            </a:r>
+              <a:rPr lang="fr-CA" dirty="0" err="1"/>
+              <a:t>Mqtt</a:t>
+            </a:r>
+            <a:endParaRPr lang="fr-CA" dirty="0"/>
           </a:p>
         </p:txBody>
       </p:sp>
@@ -3985,7 +3992,7 @@
           <p:cNvPr id="3" name="Espace réservé du contenu 2">
             <a:extLst>
               <a:ext uri="{FF2B5EF4-FFF2-40B4-BE49-F238E27FC236}">
-                <a16:creationId xmlns:a16="http://schemas.microsoft.com/office/drawing/2014/main" id="{7E54B533-9F18-470E-81AA-B7191D5B3B5A}"/>
+                <a16:creationId xmlns:a16="http://schemas.microsoft.com/office/drawing/2014/main" id="{E83EF308-18D4-4CF7-800C-C5042339D99B}"/>
               </a:ext>
             </a:extLst>
           </p:cNvPr>
@@ -3998,17 +4005,172 @@
         </p:nvSpPr>
         <p:spPr/>
         <p:txBody>
-          <a:bodyPr/>
-          <a:lstStyle/>
-          <a:p>
-            <a:endParaRPr lang="fr-CA"/>
+          <a:bodyPr>
+            <a:normAutofit/>
+          </a:bodyPr>
+          <a:lstStyle/>
+          <a:p>
+            <a:pPr>
+              <a:buFont typeface="Arial" panose="020B0604020202020204" pitchFamily="34" charset="0"/>
+              <a:buChar char="•"/>
+            </a:pPr>
+            <a:r>
+              <a:rPr lang="fr-CA" dirty="0"/>
+              <a:t>Message Queuing </a:t>
+            </a:r>
+            <a:r>
+              <a:rPr lang="fr-CA" dirty="0" err="1"/>
+              <a:t>Telemetry</a:t>
+            </a:r>
+            <a:r>
+              <a:rPr lang="fr-CA" dirty="0"/>
+              <a:t> Transport</a:t>
+            </a:r>
+          </a:p>
+          <a:p>
+            <a:pPr>
+              <a:buFont typeface="Arial" panose="020B0604020202020204" pitchFamily="34" charset="0"/>
+              <a:buChar char="•"/>
+            </a:pPr>
+            <a:r>
+              <a:rPr lang="fr-CA" dirty="0"/>
+              <a:t>Protocole de messagerie </a:t>
+            </a:r>
+            <a:r>
+              <a:rPr lang="fr-CA" dirty="0" err="1"/>
+              <a:t>publish-subscibe</a:t>
+            </a:r>
+            <a:endParaRPr lang="fr-CA" dirty="0"/>
+          </a:p>
+          <a:p>
+            <a:pPr>
+              <a:buFont typeface="Arial" panose="020B0604020202020204" pitchFamily="34" charset="0"/>
+              <a:buChar char="•"/>
+            </a:pPr>
+            <a:r>
+              <a:rPr lang="fr-CA" dirty="0"/>
+              <a:t>Inventé en 1999 par Andy Stanford-Clark (IBM) et Arlen Nipper (</a:t>
+            </a:r>
+            <a:r>
+              <a:rPr lang="fr-CA" dirty="0" err="1"/>
+              <a:t>EuroTech</a:t>
+            </a:r>
+            <a:r>
+              <a:rPr lang="fr-CA" dirty="0"/>
+              <a:t>) </a:t>
+            </a:r>
+          </a:p>
+          <a:p>
+            <a:pPr>
+              <a:buFont typeface="Arial" panose="020B0604020202020204" pitchFamily="34" charset="0"/>
+              <a:buChar char="•"/>
+            </a:pPr>
+            <a:r>
+              <a:rPr lang="fr-CA" dirty="0"/>
+              <a:t>Surveiller un oléoduc dans le désert (pipeline)</a:t>
+            </a:r>
+          </a:p>
+          <a:p>
+            <a:pPr>
+              <a:buFont typeface="Arial" panose="020B0604020202020204" pitchFamily="34" charset="0"/>
+              <a:buChar char="•"/>
+            </a:pPr>
+            <a:r>
+              <a:rPr lang="fr-CA" dirty="0"/>
+              <a:t>Protocole efficace en bande passante, léger et utilise peu d’énergie</a:t>
+            </a:r>
+          </a:p>
+          <a:p>
+            <a:pPr>
+              <a:buFont typeface="Arial" panose="020B0604020202020204" pitchFamily="34" charset="0"/>
+              <a:buChar char="•"/>
+            </a:pPr>
+            <a:r>
+              <a:rPr lang="fr-CA" dirty="0" err="1"/>
+              <a:t>Librairy</a:t>
+            </a:r>
+            <a:r>
+              <a:rPr lang="fr-CA" dirty="0"/>
+              <a:t>: c, c++, java, </a:t>
+            </a:r>
+            <a:r>
+              <a:rPr lang="fr-CA" dirty="0" err="1"/>
+              <a:t>javaScript</a:t>
+            </a:r>
+            <a:r>
+              <a:rPr lang="fr-CA" dirty="0"/>
+              <a:t>, </a:t>
+            </a:r>
+            <a:r>
+              <a:rPr lang="fr-CA" dirty="0" err="1"/>
+              <a:t>php</a:t>
+            </a:r>
+            <a:r>
+              <a:rPr lang="fr-CA" dirty="0"/>
+              <a:t>, python</a:t>
+            </a:r>
+          </a:p>
+          <a:p>
+            <a:pPr>
+              <a:buFont typeface="Arial" panose="020B0604020202020204" pitchFamily="34" charset="0"/>
+              <a:buChar char="•"/>
+            </a:pPr>
+            <a:r>
+              <a:rPr lang="fr-CA" dirty="0"/>
+              <a:t>Plateforme: Linux, </a:t>
+            </a:r>
+            <a:r>
+              <a:rPr lang="fr-CA" dirty="0" err="1"/>
+              <a:t>windows</a:t>
+            </a:r>
+            <a:r>
+              <a:rPr lang="fr-CA" dirty="0"/>
+              <a:t>, </a:t>
+            </a:r>
+            <a:r>
+              <a:rPr lang="fr-CA" dirty="0" err="1"/>
+              <a:t>ios</a:t>
+            </a:r>
+            <a:r>
+              <a:rPr lang="fr-CA" dirty="0"/>
+              <a:t>, </a:t>
+            </a:r>
+            <a:r>
+              <a:rPr lang="fr-CA" dirty="0" err="1"/>
+              <a:t>android</a:t>
+            </a:r>
+            <a:r>
+              <a:rPr lang="fr-CA" dirty="0"/>
+              <a:t>, </a:t>
+            </a:r>
+            <a:r>
+              <a:rPr lang="fr-CA" dirty="0" err="1"/>
+              <a:t>arduino</a:t>
+            </a:r>
+            <a:endParaRPr lang="fr-CA" dirty="0"/>
+          </a:p>
+          <a:p>
+            <a:pPr>
+              <a:buFont typeface="Arial" panose="020B0604020202020204" pitchFamily="34" charset="0"/>
+              <a:buChar char="•"/>
+            </a:pPr>
+            <a:r>
+              <a:rPr lang="fr-CA" dirty="0"/>
+              <a:t>Port: 1883, encrypter: 8883</a:t>
+            </a:r>
+          </a:p>
+          <a:p>
+            <a:pPr marL="0" indent="0">
+              <a:buNone/>
+            </a:pPr>
+            <a:endParaRPr lang="fr-CA" dirty="0"/>
           </a:p>
         </p:txBody>
       </p:sp>
     </p:spTree>
     <p:extLst>
       <p:ext uri="{BB962C8B-B14F-4D97-AF65-F5344CB8AC3E}">
-        <p14:creationId xmlns:p14="http://schemas.microsoft.com/office/powerpoint/2010/main" val="2328330274"/>
+        <p14:creationId xmlns:p14="http://schemas.microsoft.com/office/powerpoint/2010/main" val="1381924582"/>
       </p:ext>
     </p:extLst>
   </p:cSld>
@@ -4040,7 +4202,7 @@
           <p:cNvPr id="2" name="Titre 1">
             <a:extLst>
               <a:ext uri="{FF2B5EF4-FFF2-40B4-BE49-F238E27FC236}">
-                <a16:creationId xmlns:a16="http://schemas.microsoft.com/office/drawing/2014/main" id="{635F9CE6-7C25-4745-A904-7653FFFAF56B}"/>
+                <a16:creationId xmlns:a16="http://schemas.microsoft.com/office/drawing/2014/main" id="{FFB19E80-E57D-4C5E-B2EA-BE6076491E0F}"/>
               </a:ext>
             </a:extLst>
           </p:cNvPr>
@@ -4057,8 +4219,12 @@
           <a:lstStyle/>
           <a:p>
             <a:r>
-              <a:rPr lang="fr-CA" dirty="0"/>
-              <a:t>Programmer</a:t>
+              <a:rPr lang="fr-CA" dirty="0" err="1"/>
+              <a:t>Mqtt</a:t>
+            </a:r>
+            <a:r>
+              <a:rPr lang="fr-CA" dirty="0"/>
+              <a:t> Publisher</a:t>
             </a:r>
           </a:p>
         </p:txBody>
@@ -4068,7 +4234,7 @@
           <p:cNvPr id="3" name="Espace réservé du contenu 2">
             <a:extLst>
               <a:ext uri="{FF2B5EF4-FFF2-40B4-BE49-F238E27FC236}">
-                <a16:creationId xmlns:a16="http://schemas.microsoft.com/office/drawing/2014/main" id="{B1A3EACC-3C4A-4679-AF15-D71236A472C7}"/>
+                <a16:creationId xmlns:a16="http://schemas.microsoft.com/office/drawing/2014/main" id="{04B60945-B49B-4505-A2E0-686C416FE60C}"/>
               </a:ext>
             </a:extLst>
           </p:cNvPr>
@@ -4084,14 +4250,44 @@
           <a:bodyPr/>
           <a:lstStyle/>
           <a:p>
-            <a:endParaRPr lang="fr-CA"/>
-          </a:p>
-        </p:txBody>
-      </p:sp>
+            <a:endParaRPr lang="fr-CA" dirty="0"/>
+          </a:p>
+        </p:txBody>
+      </p:sp>
+      <p:pic>
+        <p:nvPicPr>
+          <p:cNvPr id="4" name="Image 3">
+            <a:extLst>
+              <a:ext uri="{FF2B5EF4-FFF2-40B4-BE49-F238E27FC236}">
+                <a16:creationId xmlns:a16="http://schemas.microsoft.com/office/drawing/2014/main" id="{4680542E-F735-4DFB-B216-57572B41B746}"/>
+              </a:ext>
+            </a:extLst>
+          </p:cNvPr>
+          <p:cNvPicPr>
+            <a:picLocks noChangeAspect="1"/>
+          </p:cNvPicPr>
+          <p:nvPr/>
+        </p:nvPicPr>
+        <p:blipFill>
+          <a:blip r:embed="rId2"/>
+          <a:stretch>
+            <a:fillRect/>
+          </a:stretch>
+        </p:blipFill>
+        <p:spPr>
+          <a:xfrm>
+            <a:off x="63184" y="1845734"/>
+            <a:ext cx="12054760" cy="3896698"/>
+          </a:xfrm>
+          <a:prstGeom prst="rect">
+            <a:avLst/>
+          </a:prstGeom>
+        </p:spPr>
+      </p:pic>
     </p:spTree>
     <p:extLst>
       <p:ext uri="{BB962C8B-B14F-4D97-AF65-F5344CB8AC3E}">
-        <p14:creationId xmlns:p14="http://schemas.microsoft.com/office/powerpoint/2010/main" val="3789372299"/>
+        <p14:creationId xmlns:p14="http://schemas.microsoft.com/office/powerpoint/2010/main" val="1531505921"/>
       </p:ext>
     </p:extLst>
   </p:cSld>
@@ -4123,7 +4319,7 @@
           <p:cNvPr id="2" name="Titre 1">
             <a:extLst>
               <a:ext uri="{FF2B5EF4-FFF2-40B4-BE49-F238E27FC236}">
-                <a16:creationId xmlns:a16="http://schemas.microsoft.com/office/drawing/2014/main" id="{6B0B38F8-0B04-4FD9-A29A-589678B3C7B2}"/>
+                <a16:creationId xmlns:a16="http://schemas.microsoft.com/office/drawing/2014/main" id="{D980D514-DFA8-4B86-BF20-6973F6A6E94B}"/>
               </a:ext>
             </a:extLst>
           </p:cNvPr>
@@ -4140,9 +4336,18 @@
           <a:lstStyle/>
           <a:p>
             <a:r>
-              <a:rPr lang="fr-CA" dirty="0"/>
-              <a:t>Notre code</a:t>
-            </a:r>
+              <a:rPr lang="fr-CA" dirty="0" err="1"/>
+              <a:t>Mqtt</a:t>
+            </a:r>
+            <a:r>
+              <a:rPr lang="fr-CA" dirty="0"/>
+              <a:t> </a:t>
+            </a:r>
+            <a:r>
+              <a:rPr lang="fr-CA" dirty="0" err="1"/>
+              <a:t>Subcriber</a:t>
+            </a:r>
+            <a:endParaRPr lang="fr-CA" dirty="0"/>
           </a:p>
         </p:txBody>
       </p:sp>
@@ -4151,7 +4356,7 @@
           <p:cNvPr id="3" name="Espace réservé du contenu 2">
             <a:extLst>
               <a:ext uri="{FF2B5EF4-FFF2-40B4-BE49-F238E27FC236}">
-                <a16:creationId xmlns:a16="http://schemas.microsoft.com/office/drawing/2014/main" id="{CF2FE5EB-60F5-498D-9EE5-3540A4B70F1E}"/>
+                <a16:creationId xmlns:a16="http://schemas.microsoft.com/office/drawing/2014/main" id="{A0430B24-24A8-4AD2-94D7-6E6D161CA008}"/>
               </a:ext>
             </a:extLst>
           </p:cNvPr>
@@ -4167,14 +4372,143 @@
           <a:bodyPr/>
           <a:lstStyle/>
           <a:p>
-            <a:endParaRPr lang="fr-CA"/>
+            <a:endParaRPr lang="fr-CA" dirty="0"/>
+          </a:p>
+        </p:txBody>
+      </p:sp>
+      <p:pic>
+        <p:nvPicPr>
+          <p:cNvPr id="4" name="Image 3">
+            <a:extLst>
+              <a:ext uri="{FF2B5EF4-FFF2-40B4-BE49-F238E27FC236}">
+                <a16:creationId xmlns:a16="http://schemas.microsoft.com/office/drawing/2014/main" id="{A0F1FA0F-AC59-42BD-8065-DFFB783412BC}"/>
+              </a:ext>
+            </a:extLst>
+          </p:cNvPr>
+          <p:cNvPicPr>
+            <a:picLocks noChangeAspect="1"/>
+          </p:cNvPicPr>
+          <p:nvPr/>
+        </p:nvPicPr>
+        <p:blipFill>
+          <a:blip r:embed="rId2"/>
+          <a:stretch>
+            <a:fillRect/>
+          </a:stretch>
+        </p:blipFill>
+        <p:spPr>
+          <a:xfrm>
+            <a:off x="7482" y="1845734"/>
+            <a:ext cx="5496688" cy="3778345"/>
+          </a:xfrm>
+          <a:prstGeom prst="rect">
+            <a:avLst/>
+          </a:prstGeom>
+        </p:spPr>
+      </p:pic>
+      <p:pic>
+        <p:nvPicPr>
+          <p:cNvPr id="5" name="Image 4">
+            <a:extLst>
+              <a:ext uri="{FF2B5EF4-FFF2-40B4-BE49-F238E27FC236}">
+                <a16:creationId xmlns:a16="http://schemas.microsoft.com/office/drawing/2014/main" id="{8211797B-954F-4DFF-B65A-FFE1A042FD4D}"/>
+              </a:ext>
+            </a:extLst>
+          </p:cNvPr>
+          <p:cNvPicPr>
+            <a:picLocks noChangeAspect="1"/>
+          </p:cNvPicPr>
+          <p:nvPr/>
+        </p:nvPicPr>
+        <p:blipFill>
+          <a:blip r:embed="rId3"/>
+          <a:stretch>
+            <a:fillRect/>
+          </a:stretch>
+        </p:blipFill>
+        <p:spPr>
+          <a:xfrm>
+            <a:off x="5430177" y="1325881"/>
+            <a:ext cx="6754341" cy="1587378"/>
+          </a:xfrm>
+          <a:prstGeom prst="rect">
+            <a:avLst/>
+          </a:prstGeom>
+        </p:spPr>
+      </p:pic>
+      <p:pic>
+        <p:nvPicPr>
+          <p:cNvPr id="6" name="Image 5">
+            <a:extLst>
+              <a:ext uri="{FF2B5EF4-FFF2-40B4-BE49-F238E27FC236}">
+                <a16:creationId xmlns:a16="http://schemas.microsoft.com/office/drawing/2014/main" id="{671B6AAE-AA98-4243-BB9F-3BC0CD8F5183}"/>
+              </a:ext>
+            </a:extLst>
+          </p:cNvPr>
+          <p:cNvPicPr>
+            <a:picLocks noChangeAspect="1"/>
+          </p:cNvPicPr>
+          <p:nvPr/>
+        </p:nvPicPr>
+        <p:blipFill>
+          <a:blip r:embed="rId4"/>
+          <a:stretch>
+            <a:fillRect/>
+          </a:stretch>
+        </p:blipFill>
+        <p:spPr>
+          <a:xfrm>
+            <a:off x="6096000" y="3328416"/>
+            <a:ext cx="6088518" cy="2955836"/>
+          </a:xfrm>
+          <a:prstGeom prst="rect">
+            <a:avLst/>
+          </a:prstGeom>
+        </p:spPr>
+      </p:pic>
+      <p:sp>
+        <p:nvSpPr>
+          <p:cNvPr id="7" name="ZoneTexte 6">
+            <a:extLst>
+              <a:ext uri="{FF2B5EF4-FFF2-40B4-BE49-F238E27FC236}">
+                <a16:creationId xmlns:a16="http://schemas.microsoft.com/office/drawing/2014/main" id="{F164AF2B-23F7-4514-8745-247BDEAD3A26}"/>
+              </a:ext>
+            </a:extLst>
+          </p:cNvPr>
+          <p:cNvSpPr txBox="1"/>
+          <p:nvPr/>
+        </p:nvSpPr>
+        <p:spPr>
+          <a:xfrm>
+            <a:off x="5847537" y="2591972"/>
+            <a:ext cx="840295" cy="369332"/>
+          </a:xfrm>
+          <a:prstGeom prst="rect">
+            <a:avLst/>
+          </a:prstGeom>
+          <a:noFill/>
+        </p:spPr>
+        <p:txBody>
+          <a:bodyPr wrap="none" rtlCol="0">
+            <a:spAutoFit/>
+          </a:bodyPr>
+          <a:lstStyle/>
+          <a:p>
+            <a:r>
+              <a:rPr lang="fr-CA" dirty="0">
+                <a:solidFill>
+                  <a:schemeClr val="bg1"/>
+                </a:solidFill>
+              </a:rPr>
+              <a:t>Code…</a:t>
+            </a:r>
           </a:p>
         </p:txBody>
       </p:sp>
     </p:spTree>
     <p:extLst>
       <p:ext uri="{BB962C8B-B14F-4D97-AF65-F5344CB8AC3E}">
-        <p14:creationId xmlns:p14="http://schemas.microsoft.com/office/powerpoint/2010/main" val="1561006622"/>
+        <p14:creationId xmlns:p14="http://schemas.microsoft.com/office/powerpoint/2010/main" val="524440062"/>
       </p:ext>
     </p:extLst>
   </p:cSld>
@@ -4206,7 +4540,7 @@
           <p:cNvPr id="2" name="Titre 1">
             <a:extLst>
               <a:ext uri="{FF2B5EF4-FFF2-40B4-BE49-F238E27FC236}">
-                <a16:creationId xmlns:a16="http://schemas.microsoft.com/office/drawing/2014/main" id="{7C90D369-6E20-4DC5-8B88-2BB273D153B1}"/>
+                <a16:creationId xmlns:a16="http://schemas.microsoft.com/office/drawing/2014/main" id="{321F22B7-677F-457A-AE7C-59E1C63458E5}"/>
               </a:ext>
             </a:extLst>
           </p:cNvPr>
@@ -4222,7 +4556,11 @@
           <a:bodyPr/>
           <a:lstStyle/>
           <a:p>
-            <a:endParaRPr lang="fr-CA"/>
+            <a:r>
+              <a:rPr lang="fr-CA" dirty="0" err="1"/>
+              <a:t>Pip</a:t>
+            </a:r>
+            <a:endParaRPr lang="fr-CA" dirty="0"/>
           </a:p>
         </p:txBody>
       </p:sp>
@@ -4231,7 +4569,7 @@
           <p:cNvPr id="3" name="Espace réservé du contenu 2">
             <a:extLst>
               <a:ext uri="{FF2B5EF4-FFF2-40B4-BE49-F238E27FC236}">
-                <a16:creationId xmlns:a16="http://schemas.microsoft.com/office/drawing/2014/main" id="{27245979-CB99-45E2-B4C5-F86F17A9ABD4}"/>
+                <a16:creationId xmlns:a16="http://schemas.microsoft.com/office/drawing/2014/main" id="{6C158C49-B8BE-4DE5-B634-44FEDD513D07}"/>
               </a:ext>
             </a:extLst>
           </p:cNvPr>
@@ -4247,14 +4585,137 @@
           <a:bodyPr/>
           <a:lstStyle/>
           <a:p>
-            <a:endParaRPr lang="fr-CA"/>
+            <a:pPr>
+              <a:buFont typeface="Arial" panose="020B0604020202020204" pitchFamily="34" charset="0"/>
+              <a:buChar char="•"/>
+            </a:pPr>
+            <a:r>
+              <a:rPr lang="fr-CA" dirty="0"/>
+              <a:t>Gestionnaire de paquets Python</a:t>
+            </a:r>
+          </a:p>
+          <a:p>
+            <a:pPr>
+              <a:buFont typeface="Arial" panose="020B0604020202020204" pitchFamily="34" charset="0"/>
+              <a:buChar char="•"/>
+            </a:pPr>
+            <a:r>
+              <a:rPr lang="fr-CA" dirty="0"/>
+              <a:t>Get-pip.py</a:t>
+            </a:r>
+          </a:p>
+          <a:p>
+            <a:pPr>
+              <a:buFont typeface="Arial" panose="020B0604020202020204" pitchFamily="34" charset="0"/>
+              <a:buChar char="•"/>
+            </a:pPr>
+            <a:endParaRPr lang="fr-CA" dirty="0"/>
+          </a:p>
+          <a:p>
+            <a:pPr>
+              <a:buFont typeface="Arial" panose="020B0604020202020204" pitchFamily="34" charset="0"/>
+              <a:buChar char="•"/>
+            </a:pPr>
+            <a:r>
+              <a:rPr lang="fr-CA" dirty="0" err="1"/>
+              <a:t>Pip</a:t>
+            </a:r>
+            <a:r>
+              <a:rPr lang="fr-CA" dirty="0"/>
+              <a:t> </a:t>
+            </a:r>
+            <a:r>
+              <a:rPr lang="fr-CA" dirty="0" err="1"/>
+              <a:t>install</a:t>
+            </a:r>
+            <a:r>
+              <a:rPr lang="fr-CA" dirty="0"/>
+              <a:t> </a:t>
+            </a:r>
+            <a:r>
+              <a:rPr lang="fr-CA" dirty="0" err="1"/>
+              <a:t>paho-mqtt</a:t>
+            </a:r>
+            <a:endParaRPr lang="fr-CA" dirty="0"/>
+          </a:p>
+          <a:p>
+            <a:pPr>
+              <a:buFont typeface="Arial" panose="020B0604020202020204" pitchFamily="34" charset="0"/>
+              <a:buChar char="•"/>
+            </a:pPr>
+            <a:endParaRPr lang="fr-CA" dirty="0"/>
+          </a:p>
+          <a:p>
+            <a:pPr>
+              <a:buFont typeface="Arial" panose="020B0604020202020204" pitchFamily="34" charset="0"/>
+              <a:buChar char="•"/>
+            </a:pPr>
+            <a:r>
+              <a:rPr lang="fr-CA" dirty="0" err="1"/>
+              <a:t>Pip</a:t>
+            </a:r>
+            <a:r>
+              <a:rPr lang="fr-CA" dirty="0"/>
+              <a:t> </a:t>
+            </a:r>
+            <a:r>
+              <a:rPr lang="fr-CA" dirty="0" err="1"/>
+              <a:t>install</a:t>
+            </a:r>
+            <a:r>
+              <a:rPr lang="fr-CA" dirty="0"/>
+              <a:t> </a:t>
+            </a:r>
+            <a:r>
+              <a:rPr lang="fr-CA" dirty="0" err="1"/>
+              <a:t>mysql</a:t>
+            </a:r>
+            <a:r>
+              <a:rPr lang="fr-CA" dirty="0"/>
+              <a:t>-</a:t>
+            </a:r>
+            <a:r>
+              <a:rPr lang="fr-CA" dirty="0" err="1"/>
+              <a:t>connector</a:t>
+            </a:r>
+            <a:r>
+              <a:rPr lang="fr-CA" dirty="0"/>
+              <a:t>-python</a:t>
+            </a:r>
+          </a:p>
+          <a:p>
+            <a:pPr>
+              <a:buFont typeface="Arial" panose="020B0604020202020204" pitchFamily="34" charset="0"/>
+              <a:buChar char="•"/>
+            </a:pPr>
+            <a:r>
+              <a:rPr lang="fr-CA" dirty="0" err="1"/>
+              <a:t>Pip</a:t>
+            </a:r>
+            <a:r>
+              <a:rPr lang="fr-CA" dirty="0"/>
+              <a:t> </a:t>
+            </a:r>
+            <a:r>
+              <a:rPr lang="fr-CA" dirty="0" err="1"/>
+              <a:t>install</a:t>
+            </a:r>
+            <a:r>
+              <a:rPr lang="fr-CA" dirty="0"/>
+              <a:t> </a:t>
+            </a:r>
+            <a:r>
+              <a:rPr lang="fr-CA" dirty="0" err="1"/>
+              <a:t>pymysql</a:t>
+            </a:r>
+            <a:endParaRPr lang="fr-CA" dirty="0"/>
           </a:p>
         </p:txBody>
       </p:sp>
     </p:spTree>
     <p:extLst>
       <p:ext uri="{BB962C8B-B14F-4D97-AF65-F5344CB8AC3E}">
-        <p14:creationId xmlns:p14="http://schemas.microsoft.com/office/powerpoint/2010/main" val="142341670"/>
+        <p14:creationId xmlns:p14="http://schemas.microsoft.com/office/powerpoint/2010/main" val="2442179018"/>
       </p:ext>
     </p:extLst>
   </p:cSld>
@@ -4286,7 +4747,7 @@
           <p:cNvPr id="2" name="Titre 1">
             <a:extLst>
               <a:ext uri="{FF2B5EF4-FFF2-40B4-BE49-F238E27FC236}">
-                <a16:creationId xmlns:a16="http://schemas.microsoft.com/office/drawing/2014/main" id="{88955429-080F-48BA-A9CB-6CD3BA9B9D66}"/>
+                <a16:creationId xmlns:a16="http://schemas.microsoft.com/office/drawing/2014/main" id="{2F0B0270-ACF8-4FC9-9755-9E54732CF58A}"/>
               </a:ext>
             </a:extLst>
           </p:cNvPr>
@@ -4302,7 +4763,10 @@
           <a:bodyPr/>
           <a:lstStyle/>
           <a:p>
-            <a:endParaRPr lang="fr-CA"/>
+            <a:r>
+              <a:rPr lang="fr-CA" dirty="0"/>
+              <a:t>Syntaxe</a:t>
+            </a:r>
           </a:p>
         </p:txBody>
       </p:sp>
@@ -4311,7 +4775,7 @@
           <p:cNvPr id="3" name="Espace réservé du contenu 2">
             <a:extLst>
               <a:ext uri="{FF2B5EF4-FFF2-40B4-BE49-F238E27FC236}">
-                <a16:creationId xmlns:a16="http://schemas.microsoft.com/office/drawing/2014/main" id="{473EA991-4BAD-4217-868A-7D13BB45B1F4}"/>
+                <a16:creationId xmlns:a16="http://schemas.microsoft.com/office/drawing/2014/main" id="{0E62BA0D-59EB-4DF4-B22B-3ABD4C8041C2}"/>
               </a:ext>
             </a:extLst>
           </p:cNvPr>
@@ -4322,19 +4786,92 @@
             <p:ph idx="1"/>
           </p:nvPr>
         </p:nvSpPr>
-        <p:spPr/>
-        <p:txBody>
-          <a:bodyPr/>
-          <a:lstStyle/>
-          <a:p>
-            <a:endParaRPr lang="fr-CA"/>
+        <p:spPr>
+          <a:xfrm>
+            <a:off x="1066800" y="1873166"/>
+            <a:ext cx="10058400" cy="4023360"/>
+          </a:xfrm>
+        </p:spPr>
+        <p:txBody>
+          <a:bodyPr/>
+          <a:lstStyle/>
+          <a:p>
+            <a:pPr>
+              <a:buFont typeface="Arial" panose="020B0604020202020204" pitchFamily="34" charset="0"/>
+              <a:buChar char="•"/>
+            </a:pPr>
+            <a:r>
+              <a:rPr lang="fr-CA" dirty="0"/>
+              <a:t>Commentaire: #</a:t>
+            </a:r>
+          </a:p>
+          <a:p>
+            <a:pPr>
+              <a:buFont typeface="Arial" panose="020B0604020202020204" pitchFamily="34" charset="0"/>
+              <a:buChar char="•"/>
+            </a:pPr>
+            <a:r>
+              <a:rPr lang="fr-CA" dirty="0"/>
+              <a:t>Indentation (4 espace ou tab)</a:t>
+            </a:r>
+          </a:p>
+          <a:p>
+            <a:pPr>
+              <a:buFont typeface="Arial" panose="020B0604020202020204" pitchFamily="34" charset="0"/>
+              <a:buChar char="•"/>
+            </a:pPr>
+            <a:r>
+              <a:rPr lang="fr-CA" dirty="0"/>
+              <a:t>Pas de type devant les variables</a:t>
+            </a:r>
+          </a:p>
+          <a:p>
+            <a:pPr>
+              <a:buFont typeface="Arial" panose="020B0604020202020204" pitchFamily="34" charset="0"/>
+              <a:buChar char="•"/>
+            </a:pPr>
+            <a:r>
+              <a:rPr lang="fr-CA" dirty="0"/>
+              <a:t>Fonction: </a:t>
+            </a:r>
+            <a:r>
+              <a:rPr lang="fr-CA" dirty="0" err="1"/>
+              <a:t>def</a:t>
+            </a:r>
+            <a:r>
+              <a:rPr lang="fr-CA" dirty="0"/>
+              <a:t> (pas de type, pas de </a:t>
+            </a:r>
+            <a:r>
+              <a:rPr lang="fr-CA" dirty="0" err="1"/>
+              <a:t>private</a:t>
+            </a:r>
+            <a:r>
+              <a:rPr lang="fr-CA" dirty="0"/>
+              <a:t> </a:t>
+            </a:r>
+            <a:r>
+              <a:rPr lang="fr-CA" dirty="0" err="1"/>
+              <a:t>protected</a:t>
+            </a:r>
+            <a:r>
+              <a:rPr lang="fr-CA" dirty="0"/>
+              <a:t>…)</a:t>
+            </a:r>
+          </a:p>
+          <a:p>
+            <a:pPr>
+              <a:buFont typeface="Arial" panose="020B0604020202020204" pitchFamily="34" charset="0"/>
+              <a:buChar char="•"/>
+            </a:pPr>
+            <a:endParaRPr lang="fr-CA" dirty="0"/>
           </a:p>
         </p:txBody>
       </p:sp>
     </p:spTree>
     <p:extLst>
       <p:ext uri="{BB962C8B-B14F-4D97-AF65-F5344CB8AC3E}">
-        <p14:creationId xmlns:p14="http://schemas.microsoft.com/office/powerpoint/2010/main" val="387924505"/>
+        <p14:creationId xmlns:p14="http://schemas.microsoft.com/office/powerpoint/2010/main" val="1533563795"/>
       </p:ext>
     </p:extLst>
   </p:cSld>
@@ -4366,7 +4903,7 @@
           <p:cNvPr id="2" name="Titre 1">
             <a:extLst>
               <a:ext uri="{FF2B5EF4-FFF2-40B4-BE49-F238E27FC236}">
-                <a16:creationId xmlns:a16="http://schemas.microsoft.com/office/drawing/2014/main" id="{8760ABA5-A7DA-4B38-824F-8B927FC1E498}"/>
+                <a16:creationId xmlns:a16="http://schemas.microsoft.com/office/drawing/2014/main" id="{97DC4A41-3C2A-42A6-B219-00C31CD23AAE}"/>
               </a:ext>
             </a:extLst>
           </p:cNvPr>
@@ -4384,7 +4921,7 @@
           <a:p>
             <a:r>
               <a:rPr lang="fr-CA" dirty="0"/>
-              <a:t>Source</a:t>
+              <a:t>Comparaison</a:t>
             </a:r>
           </a:p>
         </p:txBody>
@@ -4394,7 +4931,7 @@
           <p:cNvPr id="3" name="Espace réservé du contenu 2">
             <a:extLst>
               <a:ext uri="{FF2B5EF4-FFF2-40B4-BE49-F238E27FC236}">
-                <a16:creationId xmlns:a16="http://schemas.microsoft.com/office/drawing/2014/main" id="{507F7D19-5E10-43EA-9786-D345282A9CFB}"/>
+                <a16:creationId xmlns:a16="http://schemas.microsoft.com/office/drawing/2014/main" id="{7E54B533-9F18-470E-81AA-B7191D5B3B5A}"/>
               </a:ext>
             </a:extLst>
           </p:cNvPr>
@@ -4410,41 +4947,395 @@
           <a:bodyPr/>
           <a:lstStyle/>
           <a:p>
-            <a:r>
-              <a:rPr lang="fr-CA" dirty="0">
-                <a:hlinkClick r:id="rId2"/>
-              </a:rPr>
-              <a:t>https://fr.wikipedia.org/wiki/Python_(langage)</a:t>
-            </a:r>
-            <a:endParaRPr lang="fr-CA" dirty="0"/>
-          </a:p>
-          <a:p>
-            <a:r>
-              <a:rPr lang="fr-CA" dirty="0">
-                <a:hlinkClick r:id="rId3"/>
-              </a:rPr>
-              <a:t>https://www.python.org/</a:t>
-            </a:r>
-            <a:endParaRPr lang="fr-CA" dirty="0"/>
-          </a:p>
-          <a:p>
-            <a:r>
-              <a:rPr lang="fr-CA" dirty="0">
-                <a:hlinkClick r:id="rId4"/>
-              </a:rPr>
-              <a:t>https://en.wikipedia.org/wiki/Python_(programming_language)</a:t>
-            </a:r>
-            <a:endParaRPr lang="fr-CA" dirty="0"/>
-          </a:p>
-          <a:p>
-            <a:endParaRPr lang="fr-CA" dirty="0"/>
-          </a:p>
-        </p:txBody>
-      </p:sp>
+            <a:endParaRPr lang="fr-CA"/>
+          </a:p>
+        </p:txBody>
+      </p:sp>
+      <p:pic>
+        <p:nvPicPr>
+          <p:cNvPr id="4" name="Image 3">
+            <a:extLst>
+              <a:ext uri="{FF2B5EF4-FFF2-40B4-BE49-F238E27FC236}">
+                <a16:creationId xmlns:a16="http://schemas.microsoft.com/office/drawing/2014/main" id="{27BE2151-0830-4803-B86B-CEDE5B4956F9}"/>
+              </a:ext>
+            </a:extLst>
+          </p:cNvPr>
+          <p:cNvPicPr>
+            <a:picLocks noChangeAspect="1"/>
+          </p:cNvPicPr>
+          <p:nvPr/>
+        </p:nvPicPr>
+        <p:blipFill>
+          <a:blip r:embed="rId2"/>
+          <a:stretch>
+            <a:fillRect/>
+          </a:stretch>
+        </p:blipFill>
+        <p:spPr>
+          <a:xfrm>
+            <a:off x="1097280" y="1845734"/>
+            <a:ext cx="9792741" cy="4244170"/>
+          </a:xfrm>
+          <a:prstGeom prst="rect">
+            <a:avLst/>
+          </a:prstGeom>
+        </p:spPr>
+      </p:pic>
     </p:spTree>
     <p:extLst>
       <p:ext uri="{BB962C8B-B14F-4D97-AF65-F5344CB8AC3E}">
-        <p14:creationId xmlns:p14="http://schemas.microsoft.com/office/powerpoint/2010/main" val="2698680044"/>
+        <p14:creationId xmlns:p14="http://schemas.microsoft.com/office/powerpoint/2010/main" val="2328330274"/>
+      </p:ext>
+    </p:extLst>
+  </p:cSld>
+  <p:clrMapOvr>
+    <a:masterClrMapping/>
+  </p:clrMapOvr>
+</p:sld>
+</file>
+
+<file path=ppt/slides/slide16.xml><?xml version="1.0" encoding="utf-8"?>
+<p:sld xmlns:a="http://schemas.openxmlformats.org/drawingml/2006/main" xmlns:r="http://schemas.openxmlformats.org/officeDocument/2006/relationships" xmlns:p="http://schemas.openxmlformats.org/presentationml/2006/main">
+  <p:cSld>
+    <p:spTree>
+      <p:nvGrpSpPr>
+        <p:cNvPr id="1" name=""/>
+        <p:cNvGrpSpPr/>
+        <p:nvPr/>
+      </p:nvGrpSpPr>
+      <p:grpSpPr>
+        <a:xfrm>
+          <a:off x="0" y="0"/>
+          <a:ext cx="0" cy="0"/>
+          <a:chOff x="0" y="0"/>
+          <a:chExt cx="0" cy="0"/>
+        </a:xfrm>
+      </p:grpSpPr>
+      <p:sp>
+        <p:nvSpPr>
+          <p:cNvPr id="2" name="Titre 1">
+            <a:extLst>
+              <a:ext uri="{FF2B5EF4-FFF2-40B4-BE49-F238E27FC236}">
+                <a16:creationId xmlns:a16="http://schemas.microsoft.com/office/drawing/2014/main" id="{96EAE7DE-D0F5-4AE0-88B1-B40173E0C9E2}"/>
+              </a:ext>
+            </a:extLst>
+          </p:cNvPr>
+          <p:cNvSpPr>
+            <a:spLocks noGrp="1"/>
+          </p:cNvSpPr>
+          <p:nvPr>
+            <p:ph type="title"/>
+          </p:nvPr>
+        </p:nvSpPr>
+        <p:spPr/>
+        <p:txBody>
+          <a:bodyPr/>
+          <a:lstStyle/>
+          <a:p>
+            <a:r>
+              <a:rPr lang="fr-CA" dirty="0"/>
+              <a:t>Comparaison</a:t>
+            </a:r>
+          </a:p>
+        </p:txBody>
+      </p:sp>
+      <p:sp>
+        <p:nvSpPr>
+          <p:cNvPr id="3" name="Espace réservé du contenu 2">
+            <a:extLst>
+              <a:ext uri="{FF2B5EF4-FFF2-40B4-BE49-F238E27FC236}">
+                <a16:creationId xmlns:a16="http://schemas.microsoft.com/office/drawing/2014/main" id="{C08AC665-B158-4AB4-8BD7-9C25E60BB39D}"/>
+              </a:ext>
+            </a:extLst>
+          </p:cNvPr>
+          <p:cNvSpPr>
+            <a:spLocks noGrp="1"/>
+          </p:cNvSpPr>
+          <p:nvPr>
+            <p:ph idx="1"/>
+          </p:nvPr>
+        </p:nvSpPr>
+        <p:spPr/>
+        <p:txBody>
+          <a:bodyPr/>
+          <a:lstStyle/>
+          <a:p>
+            <a:endParaRPr lang="fr-CA"/>
+          </a:p>
+        </p:txBody>
+      </p:sp>
+    </p:spTree>
+    <p:extLst>
+      <p:ext uri="{BB962C8B-B14F-4D97-AF65-F5344CB8AC3E}">
+        <p14:creationId xmlns:p14="http://schemas.microsoft.com/office/powerpoint/2010/main" val="1407380528"/>
+      </p:ext>
+    </p:extLst>
+  </p:cSld>
+  <p:clrMapOvr>
+    <a:masterClrMapping/>
+  </p:clrMapOvr>
+</p:sld>
+</file>
+
+<file path=ppt/slides/slide17.xml><?xml version="1.0" encoding="utf-8"?>
+<p:sld xmlns:a="http://schemas.openxmlformats.org/drawingml/2006/main" xmlns:r="http://schemas.openxmlformats.org/officeDocument/2006/relationships" xmlns:p="http://schemas.openxmlformats.org/presentationml/2006/main">
+  <p:cSld>
+    <p:spTree>
+      <p:nvGrpSpPr>
+        <p:cNvPr id="1" name=""/>
+        <p:cNvGrpSpPr/>
+        <p:nvPr/>
+      </p:nvGrpSpPr>
+      <p:grpSpPr>
+        <a:xfrm>
+          <a:off x="0" y="0"/>
+          <a:ext cx="0" cy="0"/>
+          <a:chOff x="0" y="0"/>
+          <a:chExt cx="0" cy="0"/>
+        </a:xfrm>
+      </p:grpSpPr>
+      <p:sp>
+        <p:nvSpPr>
+          <p:cNvPr id="2" name="Titre 1">
+            <a:extLst>
+              <a:ext uri="{FF2B5EF4-FFF2-40B4-BE49-F238E27FC236}">
+                <a16:creationId xmlns:a16="http://schemas.microsoft.com/office/drawing/2014/main" id="{635F9CE6-7C25-4745-A904-7653FFFAF56B}"/>
+              </a:ext>
+            </a:extLst>
+          </p:cNvPr>
+          <p:cNvSpPr>
+            <a:spLocks noGrp="1"/>
+          </p:cNvSpPr>
+          <p:nvPr>
+            <p:ph type="title"/>
+          </p:nvPr>
+        </p:nvSpPr>
+        <p:spPr/>
+        <p:txBody>
+          <a:bodyPr/>
+          <a:lstStyle/>
+          <a:p>
+            <a:r>
+              <a:rPr lang="fr-CA" dirty="0"/>
+              <a:t>Programmer</a:t>
+            </a:r>
+          </a:p>
+        </p:txBody>
+      </p:sp>
+      <p:sp>
+        <p:nvSpPr>
+          <p:cNvPr id="3" name="Espace réservé du contenu 2">
+            <a:extLst>
+              <a:ext uri="{FF2B5EF4-FFF2-40B4-BE49-F238E27FC236}">
+                <a16:creationId xmlns:a16="http://schemas.microsoft.com/office/drawing/2014/main" id="{B1A3EACC-3C4A-4679-AF15-D71236A472C7}"/>
+              </a:ext>
+            </a:extLst>
+          </p:cNvPr>
+          <p:cNvSpPr>
+            <a:spLocks noGrp="1"/>
+          </p:cNvSpPr>
+          <p:nvPr>
+            <p:ph idx="1"/>
+          </p:nvPr>
+        </p:nvSpPr>
+        <p:spPr/>
+        <p:txBody>
+          <a:bodyPr/>
+          <a:lstStyle/>
+          <a:p>
+            <a:endParaRPr lang="fr-CA"/>
+          </a:p>
+        </p:txBody>
+      </p:sp>
+    </p:spTree>
+    <p:extLst>
+      <p:ext uri="{BB962C8B-B14F-4D97-AF65-F5344CB8AC3E}">
+        <p14:creationId xmlns:p14="http://schemas.microsoft.com/office/powerpoint/2010/main" val="3789372299"/>
+      </p:ext>
+    </p:extLst>
+  </p:cSld>
+  <p:clrMapOvr>
+    <a:masterClrMapping/>
+  </p:clrMapOvr>
+</p:sld>
+</file>
+
+<file path=ppt/slides/slide18.xml><?xml version="1.0" encoding="utf-8"?>
+<p:sld xmlns:a="http://schemas.openxmlformats.org/drawingml/2006/main" xmlns:r="http://schemas.openxmlformats.org/officeDocument/2006/relationships" xmlns:p="http://schemas.openxmlformats.org/presentationml/2006/main">
+  <p:cSld>
+    <p:spTree>
+      <p:nvGrpSpPr>
+        <p:cNvPr id="1" name=""/>
+        <p:cNvGrpSpPr/>
+        <p:nvPr/>
+      </p:nvGrpSpPr>
+      <p:grpSpPr>
+        <a:xfrm>
+          <a:off x="0" y="0"/>
+          <a:ext cx="0" cy="0"/>
+          <a:chOff x="0" y="0"/>
+          <a:chExt cx="0" cy="0"/>
+        </a:xfrm>
+      </p:grpSpPr>
+      <p:sp>
+        <p:nvSpPr>
+          <p:cNvPr id="2" name="Titre 1">
+            <a:extLst>
+              <a:ext uri="{FF2B5EF4-FFF2-40B4-BE49-F238E27FC236}">
+                <a16:creationId xmlns:a16="http://schemas.microsoft.com/office/drawing/2014/main" id="{6B0B38F8-0B04-4FD9-A29A-589678B3C7B2}"/>
+              </a:ext>
+            </a:extLst>
+          </p:cNvPr>
+          <p:cNvSpPr>
+            <a:spLocks noGrp="1"/>
+          </p:cNvSpPr>
+          <p:nvPr>
+            <p:ph type="title"/>
+          </p:nvPr>
+        </p:nvSpPr>
+        <p:spPr/>
+        <p:txBody>
+          <a:bodyPr/>
+          <a:lstStyle/>
+          <a:p>
+            <a:r>
+              <a:rPr lang="fr-CA" dirty="0"/>
+              <a:t>Notre code</a:t>
+            </a:r>
+          </a:p>
+        </p:txBody>
+      </p:sp>
+      <p:sp>
+        <p:nvSpPr>
+          <p:cNvPr id="3" name="Espace réservé du contenu 2">
+            <a:extLst>
+              <a:ext uri="{FF2B5EF4-FFF2-40B4-BE49-F238E27FC236}">
+                <a16:creationId xmlns:a16="http://schemas.microsoft.com/office/drawing/2014/main" id="{CF2FE5EB-60F5-498D-9EE5-3540A4B70F1E}"/>
+              </a:ext>
+            </a:extLst>
+          </p:cNvPr>
+          <p:cNvSpPr>
+            <a:spLocks noGrp="1"/>
+          </p:cNvSpPr>
+          <p:nvPr>
+            <p:ph idx="1"/>
+          </p:nvPr>
+        </p:nvSpPr>
+        <p:spPr/>
+        <p:txBody>
+          <a:bodyPr/>
+          <a:lstStyle/>
+          <a:p>
+            <a:r>
+              <a:rPr lang="fr-CA" dirty="0"/>
+              <a:t>Python 3.8 avec </a:t>
+            </a:r>
+            <a:r>
+              <a:rPr lang="fr-CA" dirty="0" err="1"/>
+              <a:t>PyCharm</a:t>
+            </a:r>
+            <a:r>
+              <a:rPr lang="fr-CA" dirty="0"/>
+              <a:t> </a:t>
+            </a:r>
+            <a:r>
+              <a:rPr lang="fr-CA" dirty="0" err="1"/>
+              <a:t>community</a:t>
+            </a:r>
+            <a:endParaRPr lang="fr-CA" dirty="0"/>
+          </a:p>
+          <a:p>
+            <a:r>
+              <a:rPr lang="fr-CA" dirty="0"/>
+              <a:t>Voir code</a:t>
+            </a:r>
+          </a:p>
+        </p:txBody>
+      </p:sp>
+    </p:spTree>
+    <p:extLst>
+      <p:ext uri="{BB962C8B-B14F-4D97-AF65-F5344CB8AC3E}">
+        <p14:creationId xmlns:p14="http://schemas.microsoft.com/office/powerpoint/2010/main" val="1561006622"/>
+      </p:ext>
+    </p:extLst>
+  </p:cSld>
+  <p:clrMapOvr>
+    <a:masterClrMapping/>
+  </p:clrMapOvr>
+</p:sld>
+</file>
+
+<file path=ppt/slides/slide19.xml><?xml version="1.0" encoding="utf-8"?>
+<p:sld xmlns:a="http://schemas.openxmlformats.org/drawingml/2006/main" xmlns:r="http://schemas.openxmlformats.org/officeDocument/2006/relationships" xmlns:p="http://schemas.openxmlformats.org/presentationml/2006/main">
+  <p:cSld>
+    <p:spTree>
+      <p:nvGrpSpPr>
+        <p:cNvPr id="1" name=""/>
+        <p:cNvGrpSpPr/>
+        <p:nvPr/>
+      </p:nvGrpSpPr>
+      <p:grpSpPr>
+        <a:xfrm>
+          <a:off x="0" y="0"/>
+          <a:ext cx="0" cy="0"/>
+          <a:chOff x="0" y="0"/>
+          <a:chExt cx="0" cy="0"/>
+        </a:xfrm>
+      </p:grpSpPr>
+      <p:sp>
+        <p:nvSpPr>
+          <p:cNvPr id="2" name="Titre 1">
+            <a:extLst>
+              <a:ext uri="{FF2B5EF4-FFF2-40B4-BE49-F238E27FC236}">
+                <a16:creationId xmlns:a16="http://schemas.microsoft.com/office/drawing/2014/main" id="{7C90D369-6E20-4DC5-8B88-2BB273D153B1}"/>
+              </a:ext>
+            </a:extLst>
+          </p:cNvPr>
+          <p:cNvSpPr>
+            <a:spLocks noGrp="1"/>
+          </p:cNvSpPr>
+          <p:nvPr>
+            <p:ph type="title"/>
+          </p:nvPr>
+        </p:nvSpPr>
+        <p:spPr/>
+        <p:txBody>
+          <a:bodyPr/>
+          <a:lstStyle/>
+          <a:p>
+            <a:endParaRPr lang="fr-CA"/>
+          </a:p>
+        </p:txBody>
+      </p:sp>
+      <p:sp>
+        <p:nvSpPr>
+          <p:cNvPr id="3" name="Espace réservé du contenu 2">
+            <a:extLst>
+              <a:ext uri="{FF2B5EF4-FFF2-40B4-BE49-F238E27FC236}">
+                <a16:creationId xmlns:a16="http://schemas.microsoft.com/office/drawing/2014/main" id="{27245979-CB99-45E2-B4C5-F86F17A9ABD4}"/>
+              </a:ext>
+            </a:extLst>
+          </p:cNvPr>
+          <p:cNvSpPr>
+            <a:spLocks noGrp="1"/>
+          </p:cNvSpPr>
+          <p:nvPr>
+            <p:ph idx="1"/>
+          </p:nvPr>
+        </p:nvSpPr>
+        <p:spPr/>
+        <p:txBody>
+          <a:bodyPr/>
+          <a:lstStyle/>
+          <a:p>
+            <a:endParaRPr lang="fr-CA"/>
+          </a:p>
+        </p:txBody>
+      </p:sp>
+    </p:spTree>
+    <p:extLst>
+      <p:ext uri="{BB962C8B-B14F-4D97-AF65-F5344CB8AC3E}">
+        <p14:creationId xmlns:p14="http://schemas.microsoft.com/office/powerpoint/2010/main" val="142341670"/>
       </p:ext>
     </p:extLst>
   </p:cSld>
@@ -4648,6 +5539,261 @@
     <p:extLst>
       <p:ext uri="{BB962C8B-B14F-4D97-AF65-F5344CB8AC3E}">
         <p14:creationId xmlns:p14="http://schemas.microsoft.com/office/powerpoint/2010/main" val="2239275276"/>
+      </p:ext>
+    </p:extLst>
+  </p:cSld>
+  <p:clrMapOvr>
+    <a:masterClrMapping/>
+  </p:clrMapOvr>
+</p:sld>
+</file>
+
+<file path=ppt/slides/slide20.xml><?xml version="1.0" encoding="utf-8"?>
+<p:sld xmlns:a="http://schemas.openxmlformats.org/drawingml/2006/main" xmlns:r="http://schemas.openxmlformats.org/officeDocument/2006/relationships" xmlns:p="http://schemas.openxmlformats.org/presentationml/2006/main">
+  <p:cSld>
+    <p:spTree>
+      <p:nvGrpSpPr>
+        <p:cNvPr id="1" name=""/>
+        <p:cNvGrpSpPr/>
+        <p:nvPr/>
+      </p:nvGrpSpPr>
+      <p:grpSpPr>
+        <a:xfrm>
+          <a:off x="0" y="0"/>
+          <a:ext cx="0" cy="0"/>
+          <a:chOff x="0" y="0"/>
+          <a:chExt cx="0" cy="0"/>
+        </a:xfrm>
+      </p:grpSpPr>
+      <p:sp>
+        <p:nvSpPr>
+          <p:cNvPr id="2" name="Titre 1">
+            <a:extLst>
+              <a:ext uri="{FF2B5EF4-FFF2-40B4-BE49-F238E27FC236}">
+                <a16:creationId xmlns:a16="http://schemas.microsoft.com/office/drawing/2014/main" id="{88955429-080F-48BA-A9CB-6CD3BA9B9D66}"/>
+              </a:ext>
+            </a:extLst>
+          </p:cNvPr>
+          <p:cNvSpPr>
+            <a:spLocks noGrp="1"/>
+          </p:cNvSpPr>
+          <p:nvPr>
+            <p:ph type="title"/>
+          </p:nvPr>
+        </p:nvSpPr>
+        <p:spPr/>
+        <p:txBody>
+          <a:bodyPr/>
+          <a:lstStyle/>
+          <a:p>
+            <a:endParaRPr lang="fr-CA"/>
+          </a:p>
+        </p:txBody>
+      </p:sp>
+      <p:sp>
+        <p:nvSpPr>
+          <p:cNvPr id="3" name="Espace réservé du contenu 2">
+            <a:extLst>
+              <a:ext uri="{FF2B5EF4-FFF2-40B4-BE49-F238E27FC236}">
+                <a16:creationId xmlns:a16="http://schemas.microsoft.com/office/drawing/2014/main" id="{473EA991-4BAD-4217-868A-7D13BB45B1F4}"/>
+              </a:ext>
+            </a:extLst>
+          </p:cNvPr>
+          <p:cNvSpPr>
+            <a:spLocks noGrp="1"/>
+          </p:cNvSpPr>
+          <p:nvPr>
+            <p:ph idx="1"/>
+          </p:nvPr>
+        </p:nvSpPr>
+        <p:spPr/>
+        <p:txBody>
+          <a:bodyPr/>
+          <a:lstStyle/>
+          <a:p>
+            <a:endParaRPr lang="fr-CA"/>
+          </a:p>
+        </p:txBody>
+      </p:sp>
+    </p:spTree>
+    <p:extLst>
+      <p:ext uri="{BB962C8B-B14F-4D97-AF65-F5344CB8AC3E}">
+        <p14:creationId xmlns:p14="http://schemas.microsoft.com/office/powerpoint/2010/main" val="387924505"/>
+      </p:ext>
+    </p:extLst>
+  </p:cSld>
+  <p:clrMapOvr>
+    <a:masterClrMapping/>
+  </p:clrMapOvr>
+</p:sld>
+</file>
+
+<file path=ppt/slides/slide21.xml><?xml version="1.0" encoding="utf-8"?>
+<p:sld xmlns:a="http://schemas.openxmlformats.org/drawingml/2006/main" xmlns:r="http://schemas.openxmlformats.org/officeDocument/2006/relationships" xmlns:p="http://schemas.openxmlformats.org/presentationml/2006/main">
+  <p:cSld>
+    <p:spTree>
+      <p:nvGrpSpPr>
+        <p:cNvPr id="1" name=""/>
+        <p:cNvGrpSpPr/>
+        <p:nvPr/>
+      </p:nvGrpSpPr>
+      <p:grpSpPr>
+        <a:xfrm>
+          <a:off x="0" y="0"/>
+          <a:ext cx="0" cy="0"/>
+          <a:chOff x="0" y="0"/>
+          <a:chExt cx="0" cy="0"/>
+        </a:xfrm>
+      </p:grpSpPr>
+      <p:sp>
+        <p:nvSpPr>
+          <p:cNvPr id="2" name="Titre 1">
+            <a:extLst>
+              <a:ext uri="{FF2B5EF4-FFF2-40B4-BE49-F238E27FC236}">
+                <a16:creationId xmlns:a16="http://schemas.microsoft.com/office/drawing/2014/main" id="{8760ABA5-A7DA-4B38-824F-8B927FC1E498}"/>
+              </a:ext>
+            </a:extLst>
+          </p:cNvPr>
+          <p:cNvSpPr>
+            <a:spLocks noGrp="1"/>
+          </p:cNvSpPr>
+          <p:nvPr>
+            <p:ph type="title"/>
+          </p:nvPr>
+        </p:nvSpPr>
+        <p:spPr/>
+        <p:txBody>
+          <a:bodyPr/>
+          <a:lstStyle/>
+          <a:p>
+            <a:r>
+              <a:rPr lang="fr-CA" dirty="0"/>
+              <a:t>Source</a:t>
+            </a:r>
+          </a:p>
+        </p:txBody>
+      </p:sp>
+      <p:sp>
+        <p:nvSpPr>
+          <p:cNvPr id="3" name="Espace réservé du contenu 2">
+            <a:extLst>
+              <a:ext uri="{FF2B5EF4-FFF2-40B4-BE49-F238E27FC236}">
+                <a16:creationId xmlns:a16="http://schemas.microsoft.com/office/drawing/2014/main" id="{507F7D19-5E10-43EA-9786-D345282A9CFB}"/>
+              </a:ext>
+            </a:extLst>
+          </p:cNvPr>
+          <p:cNvSpPr>
+            <a:spLocks noGrp="1"/>
+          </p:cNvSpPr>
+          <p:nvPr>
+            <p:ph idx="1"/>
+          </p:nvPr>
+        </p:nvSpPr>
+        <p:spPr/>
+        <p:txBody>
+          <a:bodyPr>
+            <a:normAutofit fontScale="92500" lnSpcReduction="20000"/>
+          </a:bodyPr>
+          <a:lstStyle/>
+          <a:p>
+            <a:r>
+              <a:rPr lang="fr-CA" dirty="0">
+                <a:hlinkClick r:id="rId2"/>
+              </a:rPr>
+              <a:t>https://fr.wikipedia.org/wiki/Python_(langage)</a:t>
+            </a:r>
+            <a:endParaRPr lang="fr-CA" dirty="0"/>
+          </a:p>
+          <a:p>
+            <a:r>
+              <a:rPr lang="fr-CA" dirty="0">
+                <a:hlinkClick r:id="rId3"/>
+              </a:rPr>
+              <a:t>https://www.python.org/</a:t>
+            </a:r>
+            <a:endParaRPr lang="fr-CA" dirty="0"/>
+          </a:p>
+          <a:p>
+            <a:r>
+              <a:rPr lang="fr-CA" dirty="0">
+                <a:hlinkClick r:id="rId4"/>
+              </a:rPr>
+              <a:t>https://en.wikipedia.org/wiki/Python_(programming_language)</a:t>
+            </a:r>
+            <a:endParaRPr lang="fr-CA" dirty="0"/>
+          </a:p>
+          <a:p>
+            <a:r>
+              <a:rPr lang="fr-CA" dirty="0">
+                <a:hlinkClick r:id="rId5"/>
+              </a:rPr>
+              <a:t>https://en.wikipedia.org/wiki/MQTT</a:t>
+            </a:r>
+            <a:endParaRPr lang="fr-CA" dirty="0"/>
+          </a:p>
+          <a:p>
+            <a:r>
+              <a:rPr lang="fr-CA" dirty="0">
+                <a:hlinkClick r:id="rId6"/>
+              </a:rPr>
+              <a:t>https://en.wikipedia.org/wiki/PyCharm</a:t>
+            </a:r>
+            <a:endParaRPr lang="fr-CA" dirty="0"/>
+          </a:p>
+          <a:p>
+            <a:r>
+              <a:rPr lang="fr-CA" dirty="0">
+                <a:hlinkClick r:id="rId7"/>
+              </a:rPr>
+              <a:t>https://fr.wikipedia.org/wiki/MQTT</a:t>
+            </a:r>
+            <a:endParaRPr lang="fr-CA" dirty="0"/>
+          </a:p>
+          <a:p>
+            <a:r>
+              <a:rPr lang="fr-CA" dirty="0">
+                <a:hlinkClick r:id="rId8"/>
+              </a:rPr>
+              <a:t>https://www.jetbrains.com/fr-fr/pycharm/</a:t>
+            </a:r>
+            <a:endParaRPr lang="fr-CA" dirty="0"/>
+          </a:p>
+          <a:p>
+            <a:r>
+              <a:rPr lang="fr-CA" dirty="0">
+                <a:hlinkClick r:id="rId7"/>
+              </a:rPr>
+              <a:t>https://fr.wikipedia.org/wiki/MQTT</a:t>
+            </a:r>
+            <a:endParaRPr lang="fr-CA" dirty="0"/>
+          </a:p>
+          <a:p>
+            <a:r>
+              <a:rPr lang="fr-CA" dirty="0">
+                <a:hlinkClick r:id="rId9"/>
+              </a:rPr>
+              <a:t>https://fr.wikipedia.org/wiki/Pip_(gestionnaire_de_paquets)</a:t>
+            </a:r>
+            <a:endParaRPr lang="fr-CA" dirty="0"/>
+          </a:p>
+          <a:p>
+            <a:r>
+              <a:rPr lang="fr-CA" dirty="0">
+                <a:hlinkClick r:id="rId10"/>
+              </a:rPr>
+              <a:t>https://pypi.org/project/pip/</a:t>
+            </a:r>
+            <a:endParaRPr lang="fr-CA" dirty="0"/>
+          </a:p>
+          <a:p>
+            <a:endParaRPr lang="fr-CA" dirty="0"/>
+          </a:p>
+        </p:txBody>
+      </p:sp>
+    </p:spTree>
+    <p:extLst>
+      <p:ext uri="{BB962C8B-B14F-4D97-AF65-F5344CB8AC3E}">
+        <p14:creationId xmlns:p14="http://schemas.microsoft.com/office/powerpoint/2010/main" val="2698680044"/>
       </p:ext>
     </p:extLst>
   </p:cSld>
@@ -5064,13 +6210,13 @@
         </p:nvSpPr>
         <p:spPr>
           <a:xfrm>
-            <a:off x="1097280" y="1845734"/>
-            <a:ext cx="10058400" cy="4419264"/>
+            <a:off x="1097280" y="1737360"/>
+            <a:ext cx="10058400" cy="4527638"/>
           </a:xfrm>
         </p:spPr>
         <p:txBody>
           <a:bodyPr>
-            <a:normAutofit/>
+            <a:normAutofit fontScale="92500" lnSpcReduction="10000"/>
           </a:bodyPr>
           <a:lstStyle/>
           <a:p>
@@ -5143,7 +6289,36 @@
             </a:pPr>
             <a:r>
               <a:rPr lang="fr-CA" dirty="0"/>
-              <a:t>G</a:t>
+              <a:t>En 1995</a:t>
+            </a:r>
+          </a:p>
+          <a:p>
+            <a:pPr lvl="1">
+              <a:buFont typeface="Arial" panose="020B0604020202020204" pitchFamily="34" charset="0"/>
+              <a:buChar char="•"/>
+            </a:pPr>
+            <a:r>
+              <a:rPr lang="fr-CA" dirty="0" err="1"/>
+              <a:t>Grail</a:t>
+            </a:r>
+            <a:r>
+              <a:rPr lang="fr-CA" dirty="0"/>
+              <a:t>: navigateur web utilisant </a:t>
+            </a:r>
+            <a:r>
+              <a:rPr lang="fr-CA" dirty="0" err="1"/>
+              <a:t>Tk</a:t>
+            </a:r>
+            <a:endParaRPr lang="fr-CA" dirty="0"/>
+          </a:p>
+          <a:p>
+            <a:pPr lvl="1">
+              <a:buFont typeface="Arial" panose="020B0604020202020204" pitchFamily="34" charset="0"/>
+              <a:buChar char="•"/>
+            </a:pPr>
+            <a:r>
+              <a:rPr lang="fr-CA" dirty="0"/>
+              <a:t>IDLE: environnement de développement</a:t>
             </a:r>
           </a:p>
           <a:p>
@@ -5181,7 +6356,7 @@
             </a:pPr>
             <a:r>
               <a:rPr lang="fr-CA" dirty="0"/>
-              <a:t>g</a:t>
+              <a:t>Python 2.0</a:t>
             </a:r>
           </a:p>
           <a:p>
@@ -5206,7 +6381,17 @@
             </a:pPr>
             <a:r>
               <a:rPr lang="fr-CA" dirty="0"/>
-              <a:t>h</a:t>
+              <a:t>Python 3.1 en 2008</a:t>
+            </a:r>
+          </a:p>
+          <a:p>
+            <a:pPr lvl="1">
+              <a:buFont typeface="Arial" panose="020B0604020202020204" pitchFamily="34" charset="0"/>
+              <a:buChar char="•"/>
+            </a:pPr>
+            <a:r>
+              <a:rPr lang="fr-CA" dirty="0"/>
+              <a:t>Dernière version: Python 3.8 en 2019</a:t>
             </a:r>
           </a:p>
         </p:txBody>
@@ -5287,7 +6472,9 @@
         </p:nvSpPr>
         <p:spPr/>
         <p:txBody>
-          <a:bodyPr/>
+          <a:bodyPr>
+            <a:normAutofit lnSpcReduction="10000"/>
+          </a:bodyPr>
           <a:lstStyle/>
           <a:p>
             <a:pPr>
@@ -5413,6 +6600,16 @@
             <a:r>
               <a:rPr lang="fr-CA" dirty="0"/>
               <a:t> Circus</a:t>
+            </a:r>
+          </a:p>
+          <a:p>
+            <a:pPr>
+              <a:buFont typeface="Arial" panose="020B0604020202020204" pitchFamily="34" charset="0"/>
+              <a:buChar char="•"/>
+            </a:pPr>
+            <a:r>
+              <a:rPr lang="fr-CA" dirty="0"/>
+              <a:t>Groupe d’humoriste: Monty Python</a:t>
             </a:r>
           </a:p>
           <a:p>
@@ -5534,10 +6731,146 @@
           <a:bodyPr/>
           <a:lstStyle/>
           <a:p>
-            <a:endParaRPr lang="fr-CA"/>
-          </a:p>
-        </p:txBody>
-      </p:sp>
+            <a:pPr>
+              <a:buFont typeface="Arial" panose="020B0604020202020204" pitchFamily="34" charset="0"/>
+              <a:buChar char="•"/>
+            </a:pPr>
+            <a:r>
+              <a:rPr lang="fr-CA" dirty="0"/>
+              <a:t>Environnement de développement intégrer</a:t>
+            </a:r>
+          </a:p>
+          <a:p>
+            <a:pPr>
+              <a:buFont typeface="Arial" panose="020B0604020202020204" pitchFamily="34" charset="0"/>
+              <a:buChar char="•"/>
+            </a:pPr>
+            <a:r>
+              <a:rPr lang="fr-CA" dirty="0"/>
+              <a:t>Logiciel multi-</a:t>
+            </a:r>
+            <a:r>
+              <a:rPr lang="fr-CA" dirty="0" err="1"/>
+              <a:t>platforme</a:t>
+            </a:r>
+            <a:endParaRPr lang="fr-CA" dirty="0"/>
+          </a:p>
+          <a:p>
+            <a:pPr>
+              <a:buFont typeface="Arial" panose="020B0604020202020204" pitchFamily="34" charset="0"/>
+              <a:buChar char="•"/>
+            </a:pPr>
+            <a:r>
+              <a:rPr lang="fr-CA" dirty="0" err="1"/>
+              <a:t>JetBrains</a:t>
+            </a:r>
+            <a:endParaRPr lang="fr-CA" dirty="0"/>
+          </a:p>
+          <a:p>
+            <a:pPr>
+              <a:buFont typeface="Arial" panose="020B0604020202020204" pitchFamily="34" charset="0"/>
+              <a:buChar char="•"/>
+            </a:pPr>
+            <a:r>
+              <a:rPr lang="fr-CA" dirty="0"/>
+              <a:t>L’interface ressemble à </a:t>
+            </a:r>
+            <a:r>
+              <a:rPr lang="fr-CA" dirty="0" err="1"/>
+              <a:t>android</a:t>
+            </a:r>
+            <a:r>
+              <a:rPr lang="fr-CA" dirty="0"/>
+              <a:t> Studio (</a:t>
+            </a:r>
+            <a:r>
+              <a:rPr lang="fr-CA" dirty="0" err="1"/>
+              <a:t>IntelliJ</a:t>
+            </a:r>
+            <a:r>
+              <a:rPr lang="fr-CA" dirty="0"/>
+              <a:t> IDEA)</a:t>
+            </a:r>
+          </a:p>
+          <a:p>
+            <a:pPr>
+              <a:buFont typeface="Arial" panose="020B0604020202020204" pitchFamily="34" charset="0"/>
+              <a:buChar char="•"/>
+            </a:pPr>
+            <a:r>
+              <a:rPr lang="fr-CA" dirty="0"/>
+              <a:t>Première version: 3 février 2010</a:t>
+            </a:r>
+          </a:p>
+          <a:p>
+            <a:pPr>
+              <a:buFont typeface="Arial" panose="020B0604020202020204" pitchFamily="34" charset="0"/>
+              <a:buChar char="•"/>
+            </a:pPr>
+            <a:r>
+              <a:rPr lang="fr-CA" dirty="0"/>
+              <a:t>Dernière version: 2020.1.1</a:t>
+            </a:r>
+          </a:p>
+          <a:p>
+            <a:pPr>
+              <a:buFont typeface="Arial" panose="020B0604020202020204" pitchFamily="34" charset="0"/>
+              <a:buChar char="•"/>
+            </a:pPr>
+            <a:r>
+              <a:rPr lang="fr-CA" dirty="0"/>
+              <a:t> Débogueur python</a:t>
+            </a:r>
+          </a:p>
+          <a:p>
+            <a:pPr>
+              <a:buFont typeface="Arial" panose="020B0604020202020204" pitchFamily="34" charset="0"/>
+              <a:buChar char="•"/>
+            </a:pPr>
+            <a:r>
+              <a:rPr lang="fr-CA" dirty="0"/>
+              <a:t>Community: Gratuit, open source</a:t>
+            </a:r>
+          </a:p>
+          <a:p>
+            <a:pPr>
+              <a:buFont typeface="Arial" panose="020B0604020202020204" pitchFamily="34" charset="0"/>
+              <a:buChar char="•"/>
+            </a:pPr>
+            <a:endParaRPr lang="fr-CA" dirty="0"/>
+          </a:p>
+        </p:txBody>
+      </p:sp>
+      <p:pic>
+        <p:nvPicPr>
+          <p:cNvPr id="4" name="Image 3">
+            <a:extLst>
+              <a:ext uri="{FF2B5EF4-FFF2-40B4-BE49-F238E27FC236}">
+                <a16:creationId xmlns:a16="http://schemas.microsoft.com/office/drawing/2014/main" id="{D508E1DC-FC20-4688-9328-ED82A888C7A5}"/>
+              </a:ext>
+            </a:extLst>
+          </p:cNvPr>
+          <p:cNvPicPr>
+            <a:picLocks noChangeAspect="1"/>
+          </p:cNvPicPr>
+          <p:nvPr/>
+        </p:nvPicPr>
+        <p:blipFill>
+          <a:blip r:embed="rId2"/>
+          <a:stretch>
+            <a:fillRect/>
+          </a:stretch>
+        </p:blipFill>
+        <p:spPr>
+          <a:xfrm>
+            <a:off x="8324850" y="1845734"/>
+            <a:ext cx="2724150" cy="2724150"/>
+          </a:xfrm>
+          <a:prstGeom prst="rect">
+            <a:avLst/>
+          </a:prstGeom>
+        </p:spPr>
+      </p:pic>
     </p:spTree>
     <p:extLst>
       <p:ext uri="{BB962C8B-B14F-4D97-AF65-F5344CB8AC3E}">
@@ -5568,63 +6901,46 @@
           <a:chExt cx="0" cy="0"/>
         </a:xfrm>
       </p:grpSpPr>
-      <p:sp>
-        <p:nvSpPr>
-          <p:cNvPr id="2" name="Titre 1">
+      <p:pic>
+        <p:nvPicPr>
+          <p:cNvPr id="5" name="Image 4" descr="Une image contenant capture d’écran, moniteur, intérieur, ordinateur&#10;&#10;Description générée automatiquement">
             <a:extLst>
               <a:ext uri="{FF2B5EF4-FFF2-40B4-BE49-F238E27FC236}">
-                <a16:creationId xmlns:a16="http://schemas.microsoft.com/office/drawing/2014/main" id="{BC0AC4AB-F481-471C-AF6A-59B4496604EB}"/>
+                <a16:creationId xmlns:a16="http://schemas.microsoft.com/office/drawing/2014/main" id="{B7EFE890-25F1-43CF-967B-C28CD90D9FF3}"/>
               </a:ext>
             </a:extLst>
           </p:cNvPr>
-          <p:cNvSpPr>
-            <a:spLocks noGrp="1"/>
-          </p:cNvSpPr>
-          <p:nvPr>
-            <p:ph type="title"/>
-          </p:nvPr>
-        </p:nvSpPr>
-        <p:spPr/>
-        <p:txBody>
-          <a:bodyPr/>
-          <a:lstStyle/>
-          <a:p>
-            <a:r>
-              <a:rPr lang="fr-CA" dirty="0"/>
-              <a:t>Library</a:t>
-            </a:r>
-          </a:p>
-        </p:txBody>
-      </p:sp>
-      <p:sp>
-        <p:nvSpPr>
-          <p:cNvPr id="3" name="Espace réservé du contenu 2">
+          <p:cNvPicPr>
+            <a:picLocks noChangeAspect="1"/>
+          </p:cNvPicPr>
+          <p:nvPr/>
+        </p:nvPicPr>
+        <p:blipFill>
+          <a:blip r:embed="rId2">
             <a:extLst>
-              <a:ext uri="{FF2B5EF4-FFF2-40B4-BE49-F238E27FC236}">
-                <a16:creationId xmlns:a16="http://schemas.microsoft.com/office/drawing/2014/main" id="{7E548D02-227D-404D-8B25-FB10CBFAD53B}"/>
+              <a:ext uri="{28A0092B-C50C-407E-A947-70E740481C1C}">
+                <a14:useLocalDpi xmlns:a14="http://schemas.microsoft.com/office/drawing/2010/main" val="0"/>
               </a:ext>
             </a:extLst>
-          </p:cNvPr>
-          <p:cNvSpPr>
-            <a:spLocks noGrp="1"/>
-          </p:cNvSpPr>
-          <p:nvPr>
-            <p:ph idx="1"/>
-          </p:nvPr>
-        </p:nvSpPr>
-        <p:spPr/>
-        <p:txBody>
-          <a:bodyPr/>
-          <a:lstStyle/>
-          <a:p>
-            <a:endParaRPr lang="fr-CA"/>
-          </a:p>
-        </p:txBody>
-      </p:sp>
+          </a:blip>
+          <a:stretch>
+            <a:fillRect/>
+          </a:stretch>
+        </p:blipFill>
+        <p:spPr>
+          <a:xfrm>
+            <a:off x="333375" y="140791"/>
+            <a:ext cx="11525250" cy="6110784"/>
+          </a:xfrm>
+          <a:prstGeom prst="rect">
+            <a:avLst/>
+          </a:prstGeom>
+        </p:spPr>
+      </p:pic>
     </p:spTree>
     <p:extLst>
       <p:ext uri="{BB962C8B-B14F-4D97-AF65-F5344CB8AC3E}">
-        <p14:creationId xmlns:p14="http://schemas.microsoft.com/office/powerpoint/2010/main" val="477513590"/>
+        <p14:creationId xmlns:p14="http://schemas.microsoft.com/office/powerpoint/2010/main" val="1701059996"/>
       </p:ext>
     </p:extLst>
   </p:cSld>
@@ -5656,7 +6972,7 @@
           <p:cNvPr id="2" name="Titre 1">
             <a:extLst>
               <a:ext uri="{FF2B5EF4-FFF2-40B4-BE49-F238E27FC236}">
-                <a16:creationId xmlns:a16="http://schemas.microsoft.com/office/drawing/2014/main" id="{2F0B0270-ACF8-4FC9-9755-9E54732CF58A}"/>
+                <a16:creationId xmlns:a16="http://schemas.microsoft.com/office/drawing/2014/main" id="{BC0AC4AB-F481-471C-AF6A-59B4496604EB}"/>
               </a:ext>
             </a:extLst>
           </p:cNvPr>
@@ -5674,7 +6990,7 @@
           <a:p>
             <a:r>
               <a:rPr lang="fr-CA" dirty="0"/>
-              <a:t>Syntaxe</a:t>
+              <a:t>Library</a:t>
             </a:r>
           </a:p>
         </p:txBody>
@@ -5684,7 +7000,7 @@
           <p:cNvPr id="3" name="Espace réservé du contenu 2">
             <a:extLst>
               <a:ext uri="{FF2B5EF4-FFF2-40B4-BE49-F238E27FC236}">
-                <a16:creationId xmlns:a16="http://schemas.microsoft.com/office/drawing/2014/main" id="{0E62BA0D-59EB-4DF4-B22B-3ABD4C8041C2}"/>
+                <a16:creationId xmlns:a16="http://schemas.microsoft.com/office/drawing/2014/main" id="{7E548D02-227D-404D-8B25-FB10CBFAD53B}"/>
               </a:ext>
             </a:extLst>
           </p:cNvPr>
@@ -5700,14 +7016,93 @@
           <a:bodyPr/>
           <a:lstStyle/>
           <a:p>
-            <a:endParaRPr lang="fr-CA"/>
-          </a:p>
-        </p:txBody>
-      </p:sp>
+            <a:pPr>
+              <a:buFont typeface="Arial" panose="020B0604020202020204" pitchFamily="34" charset="0"/>
+              <a:buChar char="•"/>
+            </a:pPr>
+            <a:r>
+              <a:rPr lang="fr-CA" dirty="0"/>
+              <a:t>Import</a:t>
+            </a:r>
+          </a:p>
+        </p:txBody>
+      </p:sp>
+      <p:pic>
+        <p:nvPicPr>
+          <p:cNvPr id="5" name="Image 4" descr="Une image contenant noir, tenant, blanc&#10;&#10;Description générée automatiquement">
+            <a:extLst>
+              <a:ext uri="{FF2B5EF4-FFF2-40B4-BE49-F238E27FC236}">
+                <a16:creationId xmlns:a16="http://schemas.microsoft.com/office/drawing/2014/main" id="{24D9D88A-14F1-4B0C-9292-3F3F79AA4531}"/>
+              </a:ext>
+            </a:extLst>
+          </p:cNvPr>
+          <p:cNvPicPr>
+            <a:picLocks noChangeAspect="1"/>
+          </p:cNvPicPr>
+          <p:nvPr/>
+        </p:nvPicPr>
+        <p:blipFill>
+          <a:blip r:embed="rId2">
+            <a:extLst>
+              <a:ext uri="{28A0092B-C50C-407E-A947-70E740481C1C}">
+                <a14:useLocalDpi xmlns:a14="http://schemas.microsoft.com/office/drawing/2010/main" val="0"/>
+              </a:ext>
+            </a:extLst>
+          </a:blip>
+          <a:stretch>
+            <a:fillRect/>
+          </a:stretch>
+        </p:blipFill>
+        <p:spPr>
+          <a:xfrm>
+            <a:off x="7250429" y="1845734"/>
+            <a:ext cx="4855845" cy="1992479"/>
+          </a:xfrm>
+          <a:prstGeom prst="rect">
+            <a:avLst/>
+          </a:prstGeom>
+        </p:spPr>
+      </p:pic>
+      <p:pic>
+        <p:nvPicPr>
+          <p:cNvPr id="7" name="Image 6" descr="Une image contenant photo, horloge, orange, noir&#10;&#10;Description générée automatiquement">
+            <a:extLst>
+              <a:ext uri="{FF2B5EF4-FFF2-40B4-BE49-F238E27FC236}">
+                <a16:creationId xmlns:a16="http://schemas.microsoft.com/office/drawing/2014/main" id="{549DC63A-EFE7-4E7F-AB8A-741217B8D2BA}"/>
+              </a:ext>
+            </a:extLst>
+          </p:cNvPr>
+          <p:cNvPicPr>
+            <a:picLocks noChangeAspect="1"/>
+          </p:cNvPicPr>
+          <p:nvPr/>
+        </p:nvPicPr>
+        <p:blipFill>
+          <a:blip r:embed="rId3">
+            <a:extLst>
+              <a:ext uri="{28A0092B-C50C-407E-A947-70E740481C1C}">
+                <a14:useLocalDpi xmlns:a14="http://schemas.microsoft.com/office/drawing/2010/main" val="0"/>
+              </a:ext>
+            </a:extLst>
+          </a:blip>
+          <a:stretch>
+            <a:fillRect/>
+          </a:stretch>
+        </p:blipFill>
+        <p:spPr>
+          <a:xfrm>
+            <a:off x="7250428" y="3946587"/>
+            <a:ext cx="4855845" cy="1187570"/>
+          </a:xfrm>
+          <a:prstGeom prst="rect">
+            <a:avLst/>
+          </a:prstGeom>
+        </p:spPr>
+      </p:pic>
     </p:spTree>
     <p:extLst>
       <p:ext uri="{BB962C8B-B14F-4D97-AF65-F5344CB8AC3E}">
-        <p14:creationId xmlns:p14="http://schemas.microsoft.com/office/powerpoint/2010/main" val="1533563795"/>
+        <p14:creationId xmlns:p14="http://schemas.microsoft.com/office/powerpoint/2010/main" val="477513590"/>
       </p:ext>
     </p:extLst>
   </p:cSld>

</xml_diff>